<commit_message>
Actualizaciones correcciones de memoria
</commit_message>
<xml_diff>
--- a/Diagramas y diseños/Mapa_de_navegacion.pptx
+++ b/Diagramas y diseños/Mapa_de_navegacion.pptx
@@ -104,6 +104,11 @@
       </a:defRPr>
     </a:lvl9pPr>
   </p:defaultTextStyle>
+  <p:extLst>
+    <p:ext uri="{EFAFB233-063F-42B5-8137-9DF3F51BA10A}">
+      <p15:sldGuideLst xmlns:p15="http://schemas.microsoft.com/office/powerpoint/2012/main"/>
+    </p:ext>
+  </p:extLst>
 </p:presentation>
 </file>
 
@@ -1192,8 +1197,12 @@
         <a:lstStyle/>
         <a:p>
           <a:r>
+            <a:rPr lang="es-CL" u="none"/>
+            <a:t>Nueva </a:t>
+          </a:r>
+          <a:r>
             <a:rPr lang="es-CL" u="none" dirty="0"/>
-            <a:t>Nuevo solicitud de fondo</a:t>
+            <a:t>solicitud de fondo</a:t>
           </a:r>
         </a:p>
       </dgm:t>
@@ -3628,8 +3637,12 @@
             <a:buNone/>
           </a:pPr>
           <a:r>
+            <a:rPr lang="es-CL" sz="1700" u="none" kern="1200"/>
+            <a:t>Nueva </a:t>
+          </a:r>
+          <a:r>
             <a:rPr lang="es-CL" sz="1700" u="none" kern="1200" dirty="0"/>
-            <a:t>Nuevo solicitud de fondo</a:t>
+            <a:t>solicitud de fondo</a:t>
           </a:r>
         </a:p>
       </dsp:txBody>
@@ -7625,7 +7638,7 @@
           <a:p>
             <a:fld id="{31569CE6-00CC-4575-B0FC-981B2FA26240}" type="datetimeFigureOut">
               <a:rPr lang="es-CL" smtClean="0"/>
-              <a:t>22-05-2019</a:t>
+              <a:t>08-09-2019</a:t>
             </a:fld>
             <a:endParaRPr lang="es-CL"/>
           </a:p>
@@ -7825,7 +7838,7 @@
           <a:p>
             <a:fld id="{31569CE6-00CC-4575-B0FC-981B2FA26240}" type="datetimeFigureOut">
               <a:rPr lang="es-CL" smtClean="0"/>
-              <a:t>22-05-2019</a:t>
+              <a:t>08-09-2019</a:t>
             </a:fld>
             <a:endParaRPr lang="es-CL"/>
           </a:p>
@@ -8035,7 +8048,7 @@
           <a:p>
             <a:fld id="{31569CE6-00CC-4575-B0FC-981B2FA26240}" type="datetimeFigureOut">
               <a:rPr lang="es-CL" smtClean="0"/>
-              <a:t>22-05-2019</a:t>
+              <a:t>08-09-2019</a:t>
             </a:fld>
             <a:endParaRPr lang="es-CL"/>
           </a:p>
@@ -8235,7 +8248,7 @@
           <a:p>
             <a:fld id="{31569CE6-00CC-4575-B0FC-981B2FA26240}" type="datetimeFigureOut">
               <a:rPr lang="es-CL" smtClean="0"/>
-              <a:t>22-05-2019</a:t>
+              <a:t>08-09-2019</a:t>
             </a:fld>
             <a:endParaRPr lang="es-CL"/>
           </a:p>
@@ -8511,7 +8524,7 @@
           <a:p>
             <a:fld id="{31569CE6-00CC-4575-B0FC-981B2FA26240}" type="datetimeFigureOut">
               <a:rPr lang="es-CL" smtClean="0"/>
-              <a:t>22-05-2019</a:t>
+              <a:t>08-09-2019</a:t>
             </a:fld>
             <a:endParaRPr lang="es-CL"/>
           </a:p>
@@ -8779,7 +8792,7 @@
           <a:p>
             <a:fld id="{31569CE6-00CC-4575-B0FC-981B2FA26240}" type="datetimeFigureOut">
               <a:rPr lang="es-CL" smtClean="0"/>
-              <a:t>22-05-2019</a:t>
+              <a:t>08-09-2019</a:t>
             </a:fld>
             <a:endParaRPr lang="es-CL"/>
           </a:p>
@@ -9194,7 +9207,7 @@
           <a:p>
             <a:fld id="{31569CE6-00CC-4575-B0FC-981B2FA26240}" type="datetimeFigureOut">
               <a:rPr lang="es-CL" smtClean="0"/>
-              <a:t>22-05-2019</a:t>
+              <a:t>08-09-2019</a:t>
             </a:fld>
             <a:endParaRPr lang="es-CL"/>
           </a:p>
@@ -9336,7 +9349,7 @@
           <a:p>
             <a:fld id="{31569CE6-00CC-4575-B0FC-981B2FA26240}" type="datetimeFigureOut">
               <a:rPr lang="es-CL" smtClean="0"/>
-              <a:t>22-05-2019</a:t>
+              <a:t>08-09-2019</a:t>
             </a:fld>
             <a:endParaRPr lang="es-CL"/>
           </a:p>
@@ -9449,7 +9462,7 @@
           <a:p>
             <a:fld id="{31569CE6-00CC-4575-B0FC-981B2FA26240}" type="datetimeFigureOut">
               <a:rPr lang="es-CL" smtClean="0"/>
-              <a:t>22-05-2019</a:t>
+              <a:t>08-09-2019</a:t>
             </a:fld>
             <a:endParaRPr lang="es-CL"/>
           </a:p>
@@ -9762,7 +9775,7 @@
           <a:p>
             <a:fld id="{31569CE6-00CC-4575-B0FC-981B2FA26240}" type="datetimeFigureOut">
               <a:rPr lang="es-CL" smtClean="0"/>
-              <a:t>22-05-2019</a:t>
+              <a:t>08-09-2019</a:t>
             </a:fld>
             <a:endParaRPr lang="es-CL"/>
           </a:p>
@@ -10051,7 +10064,7 @@
           <a:p>
             <a:fld id="{31569CE6-00CC-4575-B0FC-981B2FA26240}" type="datetimeFigureOut">
               <a:rPr lang="es-CL" smtClean="0"/>
-              <a:t>22-05-2019</a:t>
+              <a:t>08-09-2019</a:t>
             </a:fld>
             <a:endParaRPr lang="es-CL"/>
           </a:p>
@@ -10294,7 +10307,7 @@
           <a:p>
             <a:fld id="{31569CE6-00CC-4575-B0FC-981B2FA26240}" type="datetimeFigureOut">
               <a:rPr lang="es-CL" smtClean="0"/>
-              <a:t>22-05-2019</a:t>
+              <a:t>08-09-2019</a:t>
             </a:fld>
             <a:endParaRPr lang="es-CL"/>
           </a:p>
@@ -10724,7 +10737,7 @@
           <p:nvPr>
             <p:extLst>
               <p:ext uri="{D42A27DB-BD31-4B8C-83A1-F6EECF244321}">
-                <p14:modId xmlns:p14="http://schemas.microsoft.com/office/powerpoint/2010/main" val="2377437823"/>
+                <p14:modId xmlns:p14="http://schemas.microsoft.com/office/powerpoint/2010/main" val="1353991530"/>
               </p:ext>
             </p:extLst>
           </p:nvPr>

</xml_diff>